<commit_message>
fix bug ejercicio 2
</commit_message>
<xml_diff>
--- a/06_grafos/ejercicios/clase09_ejercicio_2/ejercicio_2.pptx
+++ b/06_grafos/ejercicios/clase09_ejercicio_2/ejercicio_2.pptx
@@ -7221,7 +7221,7 @@
         </p:nvSpPr>
         <p:spPr>
           <a:xfrm>
-            <a:off x="67137" y="4779486"/>
+            <a:off x="68502" y="4426969"/>
             <a:ext cx="2731694" cy="669414"/>
           </a:xfrm>
           <a:prstGeom prst="rect">
@@ -8658,7 +8658,7 @@
         </p:nvSpPr>
         <p:spPr>
           <a:xfrm>
-            <a:off x="67137" y="4779486"/>
+            <a:off x="0" y="4474086"/>
             <a:ext cx="2731694" cy="669414"/>
           </a:xfrm>
           <a:prstGeom prst="rect">
@@ -10121,7 +10121,7 @@
         </p:nvSpPr>
         <p:spPr>
           <a:xfrm>
-            <a:off x="67137" y="4779486"/>
+            <a:off x="68502" y="4486816"/>
             <a:ext cx="2731694" cy="669414"/>
           </a:xfrm>
           <a:prstGeom prst="rect">
@@ -32029,7 +32029,7 @@
         </p:nvSpPr>
         <p:spPr>
           <a:xfrm>
-            <a:off x="67137" y="4779486"/>
+            <a:off x="88644" y="4390514"/>
             <a:ext cx="2731694" cy="669414"/>
           </a:xfrm>
           <a:prstGeom prst="rect">
@@ -33500,7 +33500,7 @@
         </p:nvSpPr>
         <p:spPr>
           <a:xfrm>
-            <a:off x="67137" y="4779486"/>
+            <a:off x="96031" y="4426969"/>
             <a:ext cx="2731694" cy="669414"/>
           </a:xfrm>
           <a:prstGeom prst="rect">

</xml_diff>